<commit_message>
tuned pptx files for two presentations.
</commit_message>
<xml_diff>
--- a/DBM-Structural-Intelligence-Introduction-slides.pptx
+++ b/DBM-Structural-Intelligence-Introduction-slides.pptx
@@ -5,14 +5,14 @@
     <p:sldMasterId id="2147483648" r:id="rId1"/>
   </p:sldMasterIdLst>
   <p:sldIdLst>
-    <p:sldId id="256" r:id="rId7"/>
-    <p:sldId id="257" r:id="rId8"/>
-    <p:sldId id="258" r:id="rId9"/>
-    <p:sldId id="259" r:id="rId10"/>
-    <p:sldId id="260" r:id="rId11"/>
-    <p:sldId id="261" r:id="rId12"/>
-    <p:sldId id="262" r:id="rId13"/>
-    <p:sldId id="263" r:id="rId14"/>
+    <p:sldId id="256" r:id="rId2"/>
+    <p:sldId id="257" r:id="rId3"/>
+    <p:sldId id="258" r:id="rId4"/>
+    <p:sldId id="259" r:id="rId5"/>
+    <p:sldId id="260" r:id="rId6"/>
+    <p:sldId id="261" r:id="rId7"/>
+    <p:sldId id="262" r:id="rId8"/>
+    <p:sldId id="263" r:id="rId9"/>
   </p:sldIdLst>
   <p:sldSz cx="9144000" cy="6858000" type="screen4x3"/>
   <p:notesSz cx="6858000" cy="9144000"/>
@@ -111,6 +111,22 @@
       </a:defRPr>
     </a:lvl9pPr>
   </p:defaultTextStyle>
+  <p:extLst>
+    <p:ext uri="{EFAFB233-063F-42B5-8137-9DF3F51BA10A}">
+      <p15:sldGuideLst xmlns:p15="http://schemas.microsoft.com/office/powerpoint/2012/main">
+        <p15:guide id="1" orient="horz" pos="2160">
+          <p15:clr>
+            <a:srgbClr val="A4A3A4"/>
+          </p15:clr>
+        </p15:guide>
+        <p15:guide id="2" pos="2880">
+          <p15:clr>
+            <a:srgbClr val="A4A3A4"/>
+          </p15:clr>
+        </p15:guide>
+      </p15:sldGuideLst>
+    </p:ext>
+  </p:extLst>
 </p:presentation>
 </file>
 
@@ -152,10 +168,9 @@
           <a:lstStyle/>
           <a:p>
             <a:r>
-              <a:rPr lang="en-US" smtClean="0"/>
+              <a:rPr lang="en-US"/>
               <a:t>Click to edit Master title style</a:t>
             </a:r>
-            <a:endParaRPr lang="en-US"/>
           </a:p>
         </p:txBody>
       </p:sp>
@@ -271,10 +286,9 @@
           </a:lstStyle>
           <a:p>
             <a:r>
-              <a:rPr lang="en-US" smtClean="0"/>
+              <a:rPr lang="en-US"/>
               <a:t>Click to edit Master subtitle style</a:t>
             </a:r>
-            <a:endParaRPr lang="en-US"/>
           </a:p>
         </p:txBody>
       </p:sp>
@@ -295,7 +309,7 @@
           <a:p>
             <a:fld id="{5BCAD085-E8A6-8845-BD4E-CB4CCA059FC4}" type="datetimeFigureOut">
               <a:rPr lang="en-US" smtClean="0"/>
-              <a:t>1/27/13</a:t>
+              <a:t>2/5/26</a:t>
             </a:fld>
             <a:endParaRPr lang="en-US"/>
           </a:p>
@@ -389,10 +403,9 @@
           <a:lstStyle/>
           <a:p>
             <a:r>
-              <a:rPr lang="en-US" smtClean="0"/>
+              <a:rPr lang="en-US"/>
               <a:t>Click to edit Master title style</a:t>
             </a:r>
-            <a:endParaRPr lang="en-US"/>
           </a:p>
         </p:txBody>
       </p:sp>
@@ -413,38 +426,37 @@
           <a:p>
             <a:pPr lvl="0"/>
             <a:r>
-              <a:rPr lang="en-US" smtClean="0"/>
+              <a:rPr lang="en-US"/>
               <a:t>Click to edit Master text styles</a:t>
             </a:r>
           </a:p>
           <a:p>
             <a:pPr lvl="1"/>
             <a:r>
-              <a:rPr lang="en-US" smtClean="0"/>
+              <a:rPr lang="en-US"/>
               <a:t>Second level</a:t>
             </a:r>
           </a:p>
           <a:p>
             <a:pPr lvl="2"/>
             <a:r>
-              <a:rPr lang="en-US" smtClean="0"/>
+              <a:rPr lang="en-US"/>
               <a:t>Third level</a:t>
             </a:r>
           </a:p>
           <a:p>
             <a:pPr lvl="3"/>
             <a:r>
-              <a:rPr lang="en-US" smtClean="0"/>
+              <a:rPr lang="en-US"/>
               <a:t>Fourth level</a:t>
             </a:r>
           </a:p>
           <a:p>
             <a:pPr lvl="4"/>
             <a:r>
-              <a:rPr lang="en-US" smtClean="0"/>
+              <a:rPr lang="en-US"/>
               <a:t>Fifth level</a:t>
             </a:r>
-            <a:endParaRPr lang="en-US"/>
           </a:p>
         </p:txBody>
       </p:sp>
@@ -465,7 +477,7 @@
           <a:p>
             <a:fld id="{5BCAD085-E8A6-8845-BD4E-CB4CCA059FC4}" type="datetimeFigureOut">
               <a:rPr lang="en-US" smtClean="0"/>
-              <a:t>1/27/13</a:t>
+              <a:t>2/5/26</a:t>
             </a:fld>
             <a:endParaRPr lang="en-US"/>
           </a:p>
@@ -564,10 +576,9 @@
           <a:lstStyle/>
           <a:p>
             <a:r>
-              <a:rPr lang="en-US" smtClean="0"/>
+              <a:rPr lang="en-US"/>
               <a:t>Click to edit Master title style</a:t>
             </a:r>
-            <a:endParaRPr lang="en-US"/>
           </a:p>
         </p:txBody>
       </p:sp>
@@ -593,38 +604,37 @@
           <a:p>
             <a:pPr lvl="0"/>
             <a:r>
-              <a:rPr lang="en-US" smtClean="0"/>
+              <a:rPr lang="en-US"/>
               <a:t>Click to edit Master text styles</a:t>
             </a:r>
           </a:p>
           <a:p>
             <a:pPr lvl="1"/>
             <a:r>
-              <a:rPr lang="en-US" smtClean="0"/>
+              <a:rPr lang="en-US"/>
               <a:t>Second level</a:t>
             </a:r>
           </a:p>
           <a:p>
             <a:pPr lvl="2"/>
             <a:r>
-              <a:rPr lang="en-US" smtClean="0"/>
+              <a:rPr lang="en-US"/>
               <a:t>Third level</a:t>
             </a:r>
           </a:p>
           <a:p>
             <a:pPr lvl="3"/>
             <a:r>
-              <a:rPr lang="en-US" smtClean="0"/>
+              <a:rPr lang="en-US"/>
               <a:t>Fourth level</a:t>
             </a:r>
           </a:p>
           <a:p>
             <a:pPr lvl="4"/>
             <a:r>
-              <a:rPr lang="en-US" smtClean="0"/>
+              <a:rPr lang="en-US"/>
               <a:t>Fifth level</a:t>
             </a:r>
-            <a:endParaRPr lang="en-US"/>
           </a:p>
         </p:txBody>
       </p:sp>
@@ -645,7 +655,7 @@
           <a:p>
             <a:fld id="{5BCAD085-E8A6-8845-BD4E-CB4CCA059FC4}" type="datetimeFigureOut">
               <a:rPr lang="en-US" smtClean="0"/>
-              <a:t>1/27/13</a:t>
+              <a:t>2/5/26</a:t>
             </a:fld>
             <a:endParaRPr lang="en-US"/>
           </a:p>
@@ -739,10 +749,9 @@
           <a:lstStyle/>
           <a:p>
             <a:r>
-              <a:rPr lang="en-US" smtClean="0"/>
+              <a:rPr lang="en-US"/>
               <a:t>Click to edit Master title style</a:t>
             </a:r>
-            <a:endParaRPr lang="en-US"/>
           </a:p>
         </p:txBody>
       </p:sp>
@@ -763,38 +772,37 @@
           <a:p>
             <a:pPr lvl="0"/>
             <a:r>
-              <a:rPr lang="en-US" smtClean="0"/>
+              <a:rPr lang="en-US"/>
               <a:t>Click to edit Master text styles</a:t>
             </a:r>
           </a:p>
           <a:p>
             <a:pPr lvl="1"/>
             <a:r>
-              <a:rPr lang="en-US" smtClean="0"/>
+              <a:rPr lang="en-US"/>
               <a:t>Second level</a:t>
             </a:r>
           </a:p>
           <a:p>
             <a:pPr lvl="2"/>
             <a:r>
-              <a:rPr lang="en-US" smtClean="0"/>
+              <a:rPr lang="en-US"/>
               <a:t>Third level</a:t>
             </a:r>
           </a:p>
           <a:p>
             <a:pPr lvl="3"/>
             <a:r>
-              <a:rPr lang="en-US" smtClean="0"/>
+              <a:rPr lang="en-US"/>
               <a:t>Fourth level</a:t>
             </a:r>
           </a:p>
           <a:p>
             <a:pPr lvl="4"/>
             <a:r>
-              <a:rPr lang="en-US" smtClean="0"/>
+              <a:rPr lang="en-US"/>
               <a:t>Fifth level</a:t>
             </a:r>
-            <a:endParaRPr lang="en-US"/>
           </a:p>
         </p:txBody>
       </p:sp>
@@ -815,7 +823,7 @@
           <a:p>
             <a:fld id="{5BCAD085-E8A6-8845-BD4E-CB4CCA059FC4}" type="datetimeFigureOut">
               <a:rPr lang="en-US" smtClean="0"/>
-              <a:t>1/27/13</a:t>
+              <a:t>2/5/26</a:t>
             </a:fld>
             <a:endParaRPr lang="en-US"/>
           </a:p>
@@ -918,10 +926,9 @@
           </a:lstStyle>
           <a:p>
             <a:r>
-              <a:rPr lang="en-US" smtClean="0"/>
+              <a:rPr lang="en-US"/>
               <a:t>Click to edit Master title style</a:t>
             </a:r>
-            <a:endParaRPr lang="en-US"/>
           </a:p>
         </p:txBody>
       </p:sp>
@@ -1038,7 +1045,7 @@
           <a:p>
             <a:pPr lvl="0"/>
             <a:r>
-              <a:rPr lang="en-US" smtClean="0"/>
+              <a:rPr lang="en-US"/>
               <a:t>Click to edit Master text styles</a:t>
             </a:r>
           </a:p>
@@ -1061,7 +1068,7 @@
           <a:p>
             <a:fld id="{5BCAD085-E8A6-8845-BD4E-CB4CCA059FC4}" type="datetimeFigureOut">
               <a:rPr lang="en-US" smtClean="0"/>
-              <a:t>1/27/13</a:t>
+              <a:t>2/5/26</a:t>
             </a:fld>
             <a:endParaRPr lang="en-US"/>
           </a:p>
@@ -1155,10 +1162,9 @@
           <a:lstStyle/>
           <a:p>
             <a:r>
-              <a:rPr lang="en-US" smtClean="0"/>
+              <a:rPr lang="en-US"/>
               <a:t>Click to edit Master title style</a:t>
             </a:r>
-            <a:endParaRPr lang="en-US"/>
           </a:p>
         </p:txBody>
       </p:sp>
@@ -1212,38 +1218,37 @@
           <a:p>
             <a:pPr lvl="0"/>
             <a:r>
-              <a:rPr lang="en-US" smtClean="0"/>
+              <a:rPr lang="en-US"/>
               <a:t>Click to edit Master text styles</a:t>
             </a:r>
           </a:p>
           <a:p>
             <a:pPr lvl="1"/>
             <a:r>
-              <a:rPr lang="en-US" smtClean="0"/>
+              <a:rPr lang="en-US"/>
               <a:t>Second level</a:t>
             </a:r>
           </a:p>
           <a:p>
             <a:pPr lvl="2"/>
             <a:r>
-              <a:rPr lang="en-US" smtClean="0"/>
+              <a:rPr lang="en-US"/>
               <a:t>Third level</a:t>
             </a:r>
           </a:p>
           <a:p>
             <a:pPr lvl="3"/>
             <a:r>
-              <a:rPr lang="en-US" smtClean="0"/>
+              <a:rPr lang="en-US"/>
               <a:t>Fourth level</a:t>
             </a:r>
           </a:p>
           <a:p>
             <a:pPr lvl="4"/>
             <a:r>
-              <a:rPr lang="en-US" smtClean="0"/>
+              <a:rPr lang="en-US"/>
               <a:t>Fifth level</a:t>
             </a:r>
-            <a:endParaRPr lang="en-US"/>
           </a:p>
         </p:txBody>
       </p:sp>
@@ -1297,38 +1302,37 @@
           <a:p>
             <a:pPr lvl="0"/>
             <a:r>
-              <a:rPr lang="en-US" smtClean="0"/>
+              <a:rPr lang="en-US"/>
               <a:t>Click to edit Master text styles</a:t>
             </a:r>
           </a:p>
           <a:p>
             <a:pPr lvl="1"/>
             <a:r>
-              <a:rPr lang="en-US" smtClean="0"/>
+              <a:rPr lang="en-US"/>
               <a:t>Second level</a:t>
             </a:r>
           </a:p>
           <a:p>
             <a:pPr lvl="2"/>
             <a:r>
-              <a:rPr lang="en-US" smtClean="0"/>
+              <a:rPr lang="en-US"/>
               <a:t>Third level</a:t>
             </a:r>
           </a:p>
           <a:p>
             <a:pPr lvl="3"/>
             <a:r>
-              <a:rPr lang="en-US" smtClean="0"/>
+              <a:rPr lang="en-US"/>
               <a:t>Fourth level</a:t>
             </a:r>
           </a:p>
           <a:p>
             <a:pPr lvl="4"/>
             <a:r>
-              <a:rPr lang="en-US" smtClean="0"/>
+              <a:rPr lang="en-US"/>
               <a:t>Fifth level</a:t>
             </a:r>
-            <a:endParaRPr lang="en-US"/>
           </a:p>
         </p:txBody>
       </p:sp>
@@ -1349,7 +1353,7 @@
           <a:p>
             <a:fld id="{5BCAD085-E8A6-8845-BD4E-CB4CCA059FC4}" type="datetimeFigureOut">
               <a:rPr lang="en-US" smtClean="0"/>
-              <a:t>1/27/13</a:t>
+              <a:t>2/5/26</a:t>
             </a:fld>
             <a:endParaRPr lang="en-US"/>
           </a:p>
@@ -1447,10 +1451,9 @@
           </a:lstStyle>
           <a:p>
             <a:r>
-              <a:rPr lang="en-US" smtClean="0"/>
+              <a:rPr lang="en-US"/>
               <a:t>Click to edit Master title style</a:t>
             </a:r>
-            <a:endParaRPr lang="en-US"/>
           </a:p>
         </p:txBody>
       </p:sp>
@@ -1513,7 +1516,7 @@
           <a:p>
             <a:pPr lvl="0"/>
             <a:r>
-              <a:rPr lang="en-US" smtClean="0"/>
+              <a:rPr lang="en-US"/>
               <a:t>Click to edit Master text styles</a:t>
             </a:r>
           </a:p>
@@ -1569,38 +1572,37 @@
           <a:p>
             <a:pPr lvl="0"/>
             <a:r>
-              <a:rPr lang="en-US" smtClean="0"/>
+              <a:rPr lang="en-US"/>
               <a:t>Click to edit Master text styles</a:t>
             </a:r>
           </a:p>
           <a:p>
             <a:pPr lvl="1"/>
             <a:r>
-              <a:rPr lang="en-US" smtClean="0"/>
+              <a:rPr lang="en-US"/>
               <a:t>Second level</a:t>
             </a:r>
           </a:p>
           <a:p>
             <a:pPr lvl="2"/>
             <a:r>
-              <a:rPr lang="en-US" smtClean="0"/>
+              <a:rPr lang="en-US"/>
               <a:t>Third level</a:t>
             </a:r>
           </a:p>
           <a:p>
             <a:pPr lvl="3"/>
             <a:r>
-              <a:rPr lang="en-US" smtClean="0"/>
+              <a:rPr lang="en-US"/>
               <a:t>Fourth level</a:t>
             </a:r>
           </a:p>
           <a:p>
             <a:pPr lvl="4"/>
             <a:r>
-              <a:rPr lang="en-US" smtClean="0"/>
+              <a:rPr lang="en-US"/>
               <a:t>Fifth level</a:t>
             </a:r>
-            <a:endParaRPr lang="en-US"/>
           </a:p>
         </p:txBody>
       </p:sp>
@@ -1663,7 +1665,7 @@
           <a:p>
             <a:pPr lvl="0"/>
             <a:r>
-              <a:rPr lang="en-US" smtClean="0"/>
+              <a:rPr lang="en-US"/>
               <a:t>Click to edit Master text styles</a:t>
             </a:r>
           </a:p>
@@ -1719,38 +1721,37 @@
           <a:p>
             <a:pPr lvl="0"/>
             <a:r>
-              <a:rPr lang="en-US" smtClean="0"/>
+              <a:rPr lang="en-US"/>
               <a:t>Click to edit Master text styles</a:t>
             </a:r>
           </a:p>
           <a:p>
             <a:pPr lvl="1"/>
             <a:r>
-              <a:rPr lang="en-US" smtClean="0"/>
+              <a:rPr lang="en-US"/>
               <a:t>Second level</a:t>
             </a:r>
           </a:p>
           <a:p>
             <a:pPr lvl="2"/>
             <a:r>
-              <a:rPr lang="en-US" smtClean="0"/>
+              <a:rPr lang="en-US"/>
               <a:t>Third level</a:t>
             </a:r>
           </a:p>
           <a:p>
             <a:pPr lvl="3"/>
             <a:r>
-              <a:rPr lang="en-US" smtClean="0"/>
+              <a:rPr lang="en-US"/>
               <a:t>Fourth level</a:t>
             </a:r>
           </a:p>
           <a:p>
             <a:pPr lvl="4"/>
             <a:r>
-              <a:rPr lang="en-US" smtClean="0"/>
+              <a:rPr lang="en-US"/>
               <a:t>Fifth level</a:t>
             </a:r>
-            <a:endParaRPr lang="en-US"/>
           </a:p>
         </p:txBody>
       </p:sp>
@@ -1771,7 +1772,7 @@
           <a:p>
             <a:fld id="{5BCAD085-E8A6-8845-BD4E-CB4CCA059FC4}" type="datetimeFigureOut">
               <a:rPr lang="en-US" smtClean="0"/>
-              <a:t>1/27/13</a:t>
+              <a:t>2/5/26</a:t>
             </a:fld>
             <a:endParaRPr lang="en-US"/>
           </a:p>
@@ -1865,10 +1866,9 @@
           <a:lstStyle/>
           <a:p>
             <a:r>
-              <a:rPr lang="en-US" smtClean="0"/>
+              <a:rPr lang="en-US"/>
               <a:t>Click to edit Master title style</a:t>
             </a:r>
-            <a:endParaRPr lang="en-US"/>
           </a:p>
         </p:txBody>
       </p:sp>
@@ -1889,7 +1889,7 @@
           <a:p>
             <a:fld id="{5BCAD085-E8A6-8845-BD4E-CB4CCA059FC4}" type="datetimeFigureOut">
               <a:rPr lang="en-US" smtClean="0"/>
-              <a:t>1/27/13</a:t>
+              <a:t>2/5/26</a:t>
             </a:fld>
             <a:endParaRPr lang="en-US"/>
           </a:p>
@@ -1984,7 +1984,7 @@
           <a:p>
             <a:fld id="{5BCAD085-E8A6-8845-BD4E-CB4CCA059FC4}" type="datetimeFigureOut">
               <a:rPr lang="en-US" smtClean="0"/>
-              <a:t>1/27/13</a:t>
+              <a:t>2/5/26</a:t>
             </a:fld>
             <a:endParaRPr lang="en-US"/>
           </a:p>
@@ -2087,10 +2087,9 @@
           </a:lstStyle>
           <a:p>
             <a:r>
-              <a:rPr lang="en-US" smtClean="0"/>
+              <a:rPr lang="en-US"/>
               <a:t>Click to edit Master title style</a:t>
             </a:r>
-            <a:endParaRPr lang="en-US"/>
           </a:p>
         </p:txBody>
       </p:sp>
@@ -2144,38 +2143,37 @@
           <a:p>
             <a:pPr lvl="0"/>
             <a:r>
-              <a:rPr lang="en-US" smtClean="0"/>
+              <a:rPr lang="en-US"/>
               <a:t>Click to edit Master text styles</a:t>
             </a:r>
           </a:p>
           <a:p>
             <a:pPr lvl="1"/>
             <a:r>
-              <a:rPr lang="en-US" smtClean="0"/>
+              <a:rPr lang="en-US"/>
               <a:t>Second level</a:t>
             </a:r>
           </a:p>
           <a:p>
             <a:pPr lvl="2"/>
             <a:r>
-              <a:rPr lang="en-US" smtClean="0"/>
+              <a:rPr lang="en-US"/>
               <a:t>Third level</a:t>
             </a:r>
           </a:p>
           <a:p>
             <a:pPr lvl="3"/>
             <a:r>
-              <a:rPr lang="en-US" smtClean="0"/>
+              <a:rPr lang="en-US"/>
               <a:t>Fourth level</a:t>
             </a:r>
           </a:p>
           <a:p>
             <a:pPr lvl="4"/>
             <a:r>
-              <a:rPr lang="en-US" smtClean="0"/>
+              <a:rPr lang="en-US"/>
               <a:t>Fifth level</a:t>
             </a:r>
-            <a:endParaRPr lang="en-US"/>
           </a:p>
         </p:txBody>
       </p:sp>
@@ -2238,7 +2236,7 @@
           <a:p>
             <a:pPr lvl="0"/>
             <a:r>
-              <a:rPr lang="en-US" smtClean="0"/>
+              <a:rPr lang="en-US"/>
               <a:t>Click to edit Master text styles</a:t>
             </a:r>
           </a:p>
@@ -2261,7 +2259,7 @@
           <a:p>
             <a:fld id="{5BCAD085-E8A6-8845-BD4E-CB4CCA059FC4}" type="datetimeFigureOut">
               <a:rPr lang="en-US" smtClean="0"/>
-              <a:t>1/27/13</a:t>
+              <a:t>2/5/26</a:t>
             </a:fld>
             <a:endParaRPr lang="en-US"/>
           </a:p>
@@ -2364,10 +2362,9 @@
           </a:lstStyle>
           <a:p>
             <a:r>
-              <a:rPr lang="en-US" smtClean="0"/>
+              <a:rPr lang="en-US"/>
               <a:t>Click to edit Master title style</a:t>
             </a:r>
-            <a:endParaRPr lang="en-US"/>
           </a:p>
         </p:txBody>
       </p:sp>
@@ -2491,7 +2488,7 @@
           <a:p>
             <a:pPr lvl="0"/>
             <a:r>
-              <a:rPr lang="en-US" smtClean="0"/>
+              <a:rPr lang="en-US"/>
               <a:t>Click to edit Master text styles</a:t>
             </a:r>
           </a:p>
@@ -2514,7 +2511,7 @@
           <a:p>
             <a:fld id="{5BCAD085-E8A6-8845-BD4E-CB4CCA059FC4}" type="datetimeFigureOut">
               <a:rPr lang="en-US" smtClean="0"/>
-              <a:t>1/27/13</a:t>
+              <a:t>2/5/26</a:t>
             </a:fld>
             <a:endParaRPr lang="en-US"/>
           </a:p>
@@ -2623,10 +2620,9 @@
           <a:lstStyle/>
           <a:p>
             <a:r>
-              <a:rPr lang="en-US" smtClean="0"/>
+              <a:rPr lang="en-US"/>
               <a:t>Click to edit Master title style</a:t>
             </a:r>
-            <a:endParaRPr lang="en-US"/>
           </a:p>
         </p:txBody>
       </p:sp>
@@ -2657,38 +2653,37 @@
           <a:p>
             <a:pPr lvl="0"/>
             <a:r>
-              <a:rPr lang="en-US" smtClean="0"/>
+              <a:rPr lang="en-US"/>
               <a:t>Click to edit Master text styles</a:t>
             </a:r>
           </a:p>
           <a:p>
             <a:pPr lvl="1"/>
             <a:r>
-              <a:rPr lang="en-US" smtClean="0"/>
+              <a:rPr lang="en-US"/>
               <a:t>Second level</a:t>
             </a:r>
           </a:p>
           <a:p>
             <a:pPr lvl="2"/>
             <a:r>
-              <a:rPr lang="en-US" smtClean="0"/>
+              <a:rPr lang="en-US"/>
               <a:t>Third level</a:t>
             </a:r>
           </a:p>
           <a:p>
             <a:pPr lvl="3"/>
             <a:r>
-              <a:rPr lang="en-US" smtClean="0"/>
+              <a:rPr lang="en-US"/>
               <a:t>Fourth level</a:t>
             </a:r>
           </a:p>
           <a:p>
             <a:pPr lvl="4"/>
             <a:r>
-              <a:rPr lang="en-US" smtClean="0"/>
+              <a:rPr lang="en-US"/>
               <a:t>Fifth level</a:t>
             </a:r>
-            <a:endParaRPr lang="en-US"/>
           </a:p>
         </p:txBody>
       </p:sp>
@@ -2727,7 +2722,7 @@
           <a:p>
             <a:fld id="{5BCAD085-E8A6-8845-BD4E-CB4CCA059FC4}" type="datetimeFigureOut">
               <a:rPr lang="en-US" smtClean="0"/>
-              <a:t>1/27/13</a:t>
+              <a:t>2/5/26</a:t>
             </a:fld>
             <a:endParaRPr lang="en-US"/>
           </a:p>
@@ -3086,7 +3081,7 @@
 </file>
 
 <file path=ppt/slides/slide1.xml><?xml version="1.0" encoding="utf-8"?>
-<p:sld xmlns:a="http://schemas.openxmlformats.org/drawingml/2006/main" xmlns:p="http://schemas.openxmlformats.org/presentationml/2006/main" xmlns:r="http://schemas.openxmlformats.org/officeDocument/2006/relationships">
+<p:sld xmlns:a="http://schemas.openxmlformats.org/drawingml/2006/main" xmlns:r="http://schemas.openxmlformats.org/officeDocument/2006/relationships" xmlns:p="http://schemas.openxmlformats.org/presentationml/2006/main">
   <p:cSld>
     <p:spTree>
       <p:nvGrpSpPr>
@@ -3094,7 +3089,14 @@
         <p:cNvGrpSpPr/>
         <p:nvPr/>
       </p:nvGrpSpPr>
-      <p:grpSpPr/>
+      <p:grpSpPr>
+        <a:xfrm>
+          <a:off x="0" y="0"/>
+          <a:ext cx="0" cy="0"/>
+          <a:chOff x="0" y="0"/>
+          <a:chExt cx="0" cy="0"/>
+        </a:xfrm>
+      </p:grpSpPr>
       <p:sp>
         <p:nvSpPr>
           <p:cNvPr id="2" name="Title 1"/>
@@ -3111,6 +3113,7 @@
           <a:lstStyle/>
           <a:p>
             <a:r>
+              <a:rPr dirty="0"/>
               <a:t>DBM Structural Intelligence AI</a:t>
             </a:r>
           </a:p>
@@ -3126,14 +3129,55 @@
             <p:ph type="subTitle" idx="1"/>
           </p:nvPr>
         </p:nvSpPr>
-        <p:spPr/>
-        <p:txBody>
-          <a:bodyPr/>
-          <a:lstStyle/>
-          <a:p>
-            <a:r>
+        <p:spPr>
+          <a:xfrm>
+            <a:off x="1371600" y="3886200"/>
+            <a:ext cx="6400800" cy="2411858"/>
+          </a:xfrm>
+        </p:spPr>
+        <p:txBody>
+          <a:bodyPr>
+            <a:normAutofit fontScale="85000" lnSpcReduction="20000"/>
+          </a:bodyPr>
+          <a:lstStyle/>
+          <a:p>
+            <a:r>
+              <a:rPr dirty="0"/>
               <a:t>Beyond Models, Toward Structural Intelligence</a:t>
             </a:r>
+            <a:endParaRPr lang="en-US" dirty="0"/>
+          </a:p>
+          <a:p>
+            <a:endParaRPr lang="en-US" dirty="0"/>
+          </a:p>
+          <a:p>
+            <a:r>
+              <a:rPr lang="en-US" dirty="0"/>
+              <a:t>Sizhe Tan  </a:t>
+            </a:r>
+            <a:br>
+              <a:rPr lang="en-US" dirty="0"/>
+            </a:br>
+            <a:r>
+              <a:rPr lang="en-US" dirty="0"/>
+              <a:t>Email: </a:t>
+            </a:r>
+            <a:r>
+              <a:rPr lang="en-US" dirty="0">
+                <a:hlinkClick r:id="rId2"/>
+              </a:rPr>
+              <a:t>contact@digitalbrainmodel-ai.com</a:t>
+            </a:r>
+            <a:endParaRPr lang="en-US" dirty="0"/>
+          </a:p>
+          <a:p>
+            <a:r>
+              <a:rPr lang="en-US" dirty="0"/>
+              <a:t>February 8, 2026</a:t>
+            </a:r>
+          </a:p>
+          <a:p>
+            <a:endParaRPr dirty="0"/>
           </a:p>
         </p:txBody>
       </p:sp>
@@ -3146,7 +3190,7 @@
 </file>
 
 <file path=ppt/slides/slide2.xml><?xml version="1.0" encoding="utf-8"?>
-<p:sld xmlns:a="http://schemas.openxmlformats.org/drawingml/2006/main" xmlns:p="http://schemas.openxmlformats.org/presentationml/2006/main" xmlns:r="http://schemas.openxmlformats.org/officeDocument/2006/relationships">
+<p:sld xmlns:a="http://schemas.openxmlformats.org/drawingml/2006/main" xmlns:r="http://schemas.openxmlformats.org/officeDocument/2006/relationships" xmlns:p="http://schemas.openxmlformats.org/presentationml/2006/main">
   <p:cSld>
     <p:spTree>
       <p:nvGrpSpPr>
@@ -3154,7 +3198,14 @@
         <p:cNvGrpSpPr/>
         <p:nvPr/>
       </p:nvGrpSpPr>
-      <p:grpSpPr/>
+      <p:grpSpPr>
+        <a:xfrm>
+          <a:off x="0" y="0"/>
+          <a:ext cx="0" cy="0"/>
+          <a:chOff x="0" y="0"/>
+          <a:chExt cx="0" cy="0"/>
+        </a:xfrm>
+      </p:grpSpPr>
       <p:sp>
         <p:nvSpPr>
           <p:cNvPr id="2" name="Title 1"/>
@@ -3191,7 +3242,6 @@
           <a:bodyPr/>
           <a:lstStyle/>
           <a:p>
-            <a:pPr/>
             <a:r>
               <a:t>Beyond Models, Toward Structural Intelligence</a:t>
             </a:r>
@@ -3207,7 +3257,7 @@
 </file>
 
 <file path=ppt/slides/slide3.xml><?xml version="1.0" encoding="utf-8"?>
-<p:sld xmlns:a="http://schemas.openxmlformats.org/drawingml/2006/main" xmlns:p="http://schemas.openxmlformats.org/presentationml/2006/main" xmlns:r="http://schemas.openxmlformats.org/officeDocument/2006/relationships">
+<p:sld xmlns:a="http://schemas.openxmlformats.org/drawingml/2006/main" xmlns:r="http://schemas.openxmlformats.org/officeDocument/2006/relationships" xmlns:p="http://schemas.openxmlformats.org/presentationml/2006/main">
   <p:cSld>
     <p:spTree>
       <p:nvGrpSpPr>
@@ -3215,7 +3265,14 @@
         <p:cNvGrpSpPr/>
         <p:nvPr/>
       </p:nvGrpSpPr>
-      <p:grpSpPr/>
+      <p:grpSpPr>
+        <a:xfrm>
+          <a:off x="0" y="0"/>
+          <a:ext cx="0" cy="0"/>
+          <a:chOff x="0" y="0"/>
+          <a:chExt cx="0" cy="0"/>
+        </a:xfrm>
+      </p:grpSpPr>
       <p:sp>
         <p:nvSpPr>
           <p:cNvPr id="2" name="Title 1"/>
@@ -3252,13 +3309,11 @@
           <a:bodyPr/>
           <a:lstStyle/>
           <a:p>
-            <a:pPr/>
             <a:r>
               <a:t>Intelligence ≠ Scale</a:t>
             </a:r>
           </a:p>
           <a:p>
-            <a:pPr/>
             <a:r>
               <a:t>Intelligence = Structured Decision</a:t>
             </a:r>
@@ -3274,7 +3329,7 @@
 </file>
 
 <file path=ppt/slides/slide4.xml><?xml version="1.0" encoding="utf-8"?>
-<p:sld xmlns:a="http://schemas.openxmlformats.org/drawingml/2006/main" xmlns:p="http://schemas.openxmlformats.org/presentationml/2006/main" xmlns:r="http://schemas.openxmlformats.org/officeDocument/2006/relationships">
+<p:sld xmlns:a="http://schemas.openxmlformats.org/drawingml/2006/main" xmlns:r="http://schemas.openxmlformats.org/officeDocument/2006/relationships" xmlns:p="http://schemas.openxmlformats.org/presentationml/2006/main">
   <p:cSld>
     <p:spTree>
       <p:nvGrpSpPr>
@@ -3282,7 +3337,14 @@
         <p:cNvGrpSpPr/>
         <p:nvPr/>
       </p:nvGrpSpPr>
-      <p:grpSpPr/>
+      <p:grpSpPr>
+        <a:xfrm>
+          <a:off x="0" y="0"/>
+          <a:ext cx="0" cy="0"/>
+          <a:chOff x="0" y="0"/>
+          <a:chExt cx="0" cy="0"/>
+        </a:xfrm>
+      </p:grpSpPr>
       <p:sp>
         <p:nvSpPr>
           <p:cNvPr id="2" name="Title 1"/>
@@ -3319,13 +3381,11 @@
           <a:bodyPr/>
           <a:lstStyle/>
           <a:p>
-            <a:pPr/>
             <a:r>
               <a:t>Reasoning within structured spaces</a:t>
             </a:r>
           </a:p>
           <a:p>
-            <a:pPr/>
             <a:r>
               <a:t>Pruning before optimization</a:t>
             </a:r>
@@ -3341,7 +3401,7 @@
 </file>
 
 <file path=ppt/slides/slide5.xml><?xml version="1.0" encoding="utf-8"?>
-<p:sld xmlns:a="http://schemas.openxmlformats.org/drawingml/2006/main" xmlns:p="http://schemas.openxmlformats.org/presentationml/2006/main" xmlns:r="http://schemas.openxmlformats.org/officeDocument/2006/relationships">
+<p:sld xmlns:a="http://schemas.openxmlformats.org/drawingml/2006/main" xmlns:r="http://schemas.openxmlformats.org/officeDocument/2006/relationships" xmlns:p="http://schemas.openxmlformats.org/presentationml/2006/main">
   <p:cSld>
     <p:spTree>
       <p:nvGrpSpPr>
@@ -3349,7 +3409,14 @@
         <p:cNvGrpSpPr/>
         <p:nvPr/>
       </p:nvGrpSpPr>
-      <p:grpSpPr/>
+      <p:grpSpPr>
+        <a:xfrm>
+          <a:off x="0" y="0"/>
+          <a:ext cx="0" cy="0"/>
+          <a:chOff x="0" y="0"/>
+          <a:chExt cx="0" cy="0"/>
+        </a:xfrm>
+      </p:grpSpPr>
       <p:sp>
         <p:nvSpPr>
           <p:cNvPr id="2" name="Title 1"/>
@@ -3386,13 +3453,11 @@
           <a:bodyPr/>
           <a:lstStyle/>
           <a:p>
-            <a:pPr/>
             <a:r>
               <a:t>Compare differences</a:t>
             </a:r>
           </a:p>
           <a:p>
-            <a:pPr/>
             <a:r>
               <a:t>Decide by contrast</a:t>
             </a:r>
@@ -3408,7 +3473,7 @@
 </file>
 
 <file path=ppt/slides/slide6.xml><?xml version="1.0" encoding="utf-8"?>
-<p:sld xmlns:a="http://schemas.openxmlformats.org/drawingml/2006/main" xmlns:p="http://schemas.openxmlformats.org/presentationml/2006/main" xmlns:r="http://schemas.openxmlformats.org/officeDocument/2006/relationships">
+<p:sld xmlns:a="http://schemas.openxmlformats.org/drawingml/2006/main" xmlns:r="http://schemas.openxmlformats.org/officeDocument/2006/relationships" xmlns:p="http://schemas.openxmlformats.org/presentationml/2006/main">
   <p:cSld>
     <p:spTree>
       <p:nvGrpSpPr>
@@ -3416,7 +3481,14 @@
         <p:cNvGrpSpPr/>
         <p:nvPr/>
       </p:nvGrpSpPr>
-      <p:grpSpPr/>
+      <p:grpSpPr>
+        <a:xfrm>
+          <a:off x="0" y="0"/>
+          <a:ext cx="0" cy="0"/>
+          <a:chOff x="0" y="0"/>
+          <a:chExt cx="0" cy="0"/>
+        </a:xfrm>
+      </p:grpSpPr>
       <p:sp>
         <p:nvSpPr>
           <p:cNvPr id="2" name="Title 1"/>
@@ -3453,7 +3525,6 @@
           <a:bodyPr/>
           <a:lstStyle/>
           <a:p>
-            <a:pPr/>
             <a:r>
               <a:t>IR → Structural Index → Decision</a:t>
             </a:r>
@@ -3469,7 +3540,7 @@
 </file>
 
 <file path=ppt/slides/slide7.xml><?xml version="1.0" encoding="utf-8"?>
-<p:sld xmlns:a="http://schemas.openxmlformats.org/drawingml/2006/main" xmlns:p="http://schemas.openxmlformats.org/presentationml/2006/main" xmlns:r="http://schemas.openxmlformats.org/officeDocument/2006/relationships">
+<p:sld xmlns:a="http://schemas.openxmlformats.org/drawingml/2006/main" xmlns:r="http://schemas.openxmlformats.org/officeDocument/2006/relationships" xmlns:p="http://schemas.openxmlformats.org/presentationml/2006/main">
   <p:cSld>
     <p:spTree>
       <p:nvGrpSpPr>
@@ -3477,7 +3548,14 @@
         <p:cNvGrpSpPr/>
         <p:nvPr/>
       </p:nvGrpSpPr>
-      <p:grpSpPr/>
+      <p:grpSpPr>
+        <a:xfrm>
+          <a:off x="0" y="0"/>
+          <a:ext cx="0" cy="0"/>
+          <a:chOff x="0" y="0"/>
+          <a:chExt cx="0" cy="0"/>
+        </a:xfrm>
+      </p:grpSpPr>
       <p:sp>
         <p:nvSpPr>
           <p:cNvPr id="2" name="Title 1"/>
@@ -3514,19 +3592,16 @@
           <a:bodyPr/>
           <a:lstStyle/>
           <a:p>
-            <a:pPr/>
             <a:r>
               <a:t>DBM decides what</a:t>
             </a:r>
           </a:p>
           <a:p>
-            <a:pPr/>
             <a:r>
               <a:t>ACLM executes how</a:t>
             </a:r>
           </a:p>
           <a:p>
-            <a:pPr/>
             <a:r>
               <a:t>LLM generates content</a:t>
             </a:r>
@@ -3542,7 +3617,7 @@
 </file>
 
 <file path=ppt/slides/slide8.xml><?xml version="1.0" encoding="utf-8"?>
-<p:sld xmlns:a="http://schemas.openxmlformats.org/drawingml/2006/main" xmlns:p="http://schemas.openxmlformats.org/presentationml/2006/main" xmlns:r="http://schemas.openxmlformats.org/officeDocument/2006/relationships">
+<p:sld xmlns:a="http://schemas.openxmlformats.org/drawingml/2006/main" xmlns:r="http://schemas.openxmlformats.org/officeDocument/2006/relationships" xmlns:p="http://schemas.openxmlformats.org/presentationml/2006/main">
   <p:cSld>
     <p:spTree>
       <p:nvGrpSpPr>
@@ -3550,7 +3625,14 @@
         <p:cNvGrpSpPr/>
         <p:nvPr/>
       </p:nvGrpSpPr>
-      <p:grpSpPr/>
+      <p:grpSpPr>
+        <a:xfrm>
+          <a:off x="0" y="0"/>
+          <a:ext cx="0" cy="0"/>
+          <a:chOff x="0" y="0"/>
+          <a:chExt cx="0" cy="0"/>
+        </a:xfrm>
+      </p:grpSpPr>
       <p:sp>
         <p:nvSpPr>
           <p:cNvPr id="2" name="Title 1"/>
@@ -3587,7 +3669,6 @@
           <a:bodyPr/>
           <a:lstStyle/>
           <a:p>
-            <a:pPr/>
             <a:r>
               <a:t>Structural Intelligence is safer reasoning</a:t>
             </a:r>

</xml_diff>